<commit_message>
Changed drift move images as well
</commit_message>
<xml_diff>
--- a/IROS17/pictures/pdf/driftmove.pptx
+++ b/IROS17/pictures/pdf/driftmove.pptx
@@ -288,7 +288,7 @@
           <a:p>
             <a:fld id="{2ECC5DDF-89BA-FF4F-A8D3-F81D48191EB2}" type="datetimeFigureOut">
               <a:rPr lang="en-US" smtClean="0"/>
-              <a:t>8/31/16</a:t>
+              <a:t>2/20/17</a:t>
             </a:fld>
             <a:endParaRPr lang="en-US"/>
           </a:p>
@@ -458,7 +458,7 @@
           <a:p>
             <a:fld id="{2ECC5DDF-89BA-FF4F-A8D3-F81D48191EB2}" type="datetimeFigureOut">
               <a:rPr lang="en-US" smtClean="0"/>
-              <a:t>8/31/16</a:t>
+              <a:t>2/20/17</a:t>
             </a:fld>
             <a:endParaRPr lang="en-US"/>
           </a:p>
@@ -638,7 +638,7 @@
           <a:p>
             <a:fld id="{2ECC5DDF-89BA-FF4F-A8D3-F81D48191EB2}" type="datetimeFigureOut">
               <a:rPr lang="en-US" smtClean="0"/>
-              <a:t>8/31/16</a:t>
+              <a:t>2/20/17</a:t>
             </a:fld>
             <a:endParaRPr lang="en-US"/>
           </a:p>
@@ -808,7 +808,7 @@
           <a:p>
             <a:fld id="{2ECC5DDF-89BA-FF4F-A8D3-F81D48191EB2}" type="datetimeFigureOut">
               <a:rPr lang="en-US" smtClean="0"/>
-              <a:t>8/31/16</a:t>
+              <a:t>2/20/17</a:t>
             </a:fld>
             <a:endParaRPr lang="en-US"/>
           </a:p>
@@ -1054,7 +1054,7 @@
           <a:p>
             <a:fld id="{2ECC5DDF-89BA-FF4F-A8D3-F81D48191EB2}" type="datetimeFigureOut">
               <a:rPr lang="en-US" smtClean="0"/>
-              <a:t>8/31/16</a:t>
+              <a:t>2/20/17</a:t>
             </a:fld>
             <a:endParaRPr lang="en-US"/>
           </a:p>
@@ -1342,7 +1342,7 @@
           <a:p>
             <a:fld id="{2ECC5DDF-89BA-FF4F-A8D3-F81D48191EB2}" type="datetimeFigureOut">
               <a:rPr lang="en-US" smtClean="0"/>
-              <a:t>8/31/16</a:t>
+              <a:t>2/20/17</a:t>
             </a:fld>
             <a:endParaRPr lang="en-US"/>
           </a:p>
@@ -1764,7 +1764,7 @@
           <a:p>
             <a:fld id="{2ECC5DDF-89BA-FF4F-A8D3-F81D48191EB2}" type="datetimeFigureOut">
               <a:rPr lang="en-US" smtClean="0"/>
-              <a:t>8/31/16</a:t>
+              <a:t>2/20/17</a:t>
             </a:fld>
             <a:endParaRPr lang="en-US"/>
           </a:p>
@@ -1882,7 +1882,7 @@
           <a:p>
             <a:fld id="{2ECC5DDF-89BA-FF4F-A8D3-F81D48191EB2}" type="datetimeFigureOut">
               <a:rPr lang="en-US" smtClean="0"/>
-              <a:t>8/31/16</a:t>
+              <a:t>2/20/17</a:t>
             </a:fld>
             <a:endParaRPr lang="en-US"/>
           </a:p>
@@ -1977,7 +1977,7 @@
           <a:p>
             <a:fld id="{2ECC5DDF-89BA-FF4F-A8D3-F81D48191EB2}" type="datetimeFigureOut">
               <a:rPr lang="en-US" smtClean="0"/>
-              <a:t>8/31/16</a:t>
+              <a:t>2/20/17</a:t>
             </a:fld>
             <a:endParaRPr lang="en-US"/>
           </a:p>
@@ -2254,7 +2254,7 @@
           <a:p>
             <a:fld id="{2ECC5DDF-89BA-FF4F-A8D3-F81D48191EB2}" type="datetimeFigureOut">
               <a:rPr lang="en-US" smtClean="0"/>
-              <a:t>8/31/16</a:t>
+              <a:t>2/20/17</a:t>
             </a:fld>
             <a:endParaRPr lang="en-US"/>
           </a:p>
@@ -2507,7 +2507,7 @@
           <a:p>
             <a:fld id="{2ECC5DDF-89BA-FF4F-A8D3-F81D48191EB2}" type="datetimeFigureOut">
               <a:rPr lang="en-US" smtClean="0"/>
-              <a:t>8/31/16</a:t>
+              <a:t>2/20/17</a:t>
             </a:fld>
             <a:endParaRPr lang="en-US"/>
           </a:p>
@@ -2720,7 +2720,7 @@
           <a:p>
             <a:fld id="{2ECC5DDF-89BA-FF4F-A8D3-F81D48191EB2}" type="datetimeFigureOut">
               <a:rPr lang="en-US" smtClean="0"/>
-              <a:t>8/31/16</a:t>
+              <a:t>2/20/17</a:t>
             </a:fld>
             <a:endParaRPr lang="en-US"/>
           </a:p>
@@ -3132,80 +3132,6 @@
           </a:fontRef>
         </p:style>
       </p:cxnSp>
-      <p:cxnSp>
-        <p:nvCxnSpPr>
-          <p:cNvPr id="86" name="Straight Arrow Connector 85"/>
-          <p:cNvCxnSpPr/>
-          <p:nvPr/>
-        </p:nvCxnSpPr>
-        <p:spPr>
-          <a:xfrm flipV="1">
-            <a:off x="1512016" y="1226582"/>
-            <a:ext cx="1391326" cy="818256"/>
-          </a:xfrm>
-          <a:prstGeom prst="straightConnector1">
-            <a:avLst/>
-          </a:prstGeom>
-          <a:ln w="38100" cmpd="sng">
-            <a:solidFill>
-              <a:srgbClr val="FF0000"/>
-            </a:solidFill>
-            <a:headEnd type="none"/>
-            <a:tailEnd type="triangle"/>
-          </a:ln>
-        </p:spPr>
-        <p:style>
-          <a:lnRef idx="2">
-            <a:schemeClr val="accent1"/>
-          </a:lnRef>
-          <a:fillRef idx="0">
-            <a:schemeClr val="accent1"/>
-          </a:fillRef>
-          <a:effectRef idx="1">
-            <a:schemeClr val="accent1"/>
-          </a:effectRef>
-          <a:fontRef idx="minor">
-            <a:schemeClr val="tx1"/>
-          </a:fontRef>
-        </p:style>
-      </p:cxnSp>
-      <p:cxnSp>
-        <p:nvCxnSpPr>
-          <p:cNvPr id="87" name="Straight Arrow Connector 86"/>
-          <p:cNvCxnSpPr/>
-          <p:nvPr/>
-        </p:nvCxnSpPr>
-        <p:spPr>
-          <a:xfrm flipH="1">
-            <a:off x="1181742" y="1226582"/>
-            <a:ext cx="1721600" cy="0"/>
-          </a:xfrm>
-          <a:prstGeom prst="straightConnector1">
-            <a:avLst/>
-          </a:prstGeom>
-          <a:ln w="38100" cmpd="sng">
-            <a:solidFill>
-              <a:srgbClr val="FF0000"/>
-            </a:solidFill>
-            <a:headEnd type="none"/>
-            <a:tailEnd type="triangle"/>
-          </a:ln>
-        </p:spPr>
-        <p:style>
-          <a:lnRef idx="2">
-            <a:schemeClr val="accent1"/>
-          </a:lnRef>
-          <a:fillRef idx="0">
-            <a:schemeClr val="accent1"/>
-          </a:fillRef>
-          <a:effectRef idx="1">
-            <a:schemeClr val="accent1"/>
-          </a:effectRef>
-          <a:fontRef idx="minor">
-            <a:schemeClr val="tx1"/>
-          </a:fontRef>
-        </p:style>
-      </p:cxnSp>
       <p:sp>
         <p:nvSpPr>
           <p:cNvPr id="88" name="Right Brace 87"/>
@@ -3434,102 +3360,6 @@
               <a:latin typeface="Times New Roman"/>
               <a:cs typeface="Times New Roman"/>
             </a:endParaRPr>
-          </a:p>
-        </p:txBody>
-      </p:sp>
-      <p:sp>
-        <p:nvSpPr>
-          <p:cNvPr id="94" name="Oval 93"/>
-          <p:cNvSpPr>
-            <a:spLocks noChangeAspect="1"/>
-          </p:cNvSpPr>
-          <p:nvPr/>
-        </p:nvSpPr>
-        <p:spPr>
-          <a:xfrm>
-            <a:off x="7769752" y="1186765"/>
-            <a:ext cx="547910" cy="548640"/>
-          </a:xfrm>
-          <a:prstGeom prst="ellipse">
-            <a:avLst/>
-          </a:prstGeom>
-          <a:solidFill>
-            <a:schemeClr val="accent1">
-              <a:alpha val="78000"/>
-            </a:schemeClr>
-          </a:solidFill>
-          <a:ln>
-            <a:noFill/>
-          </a:ln>
-        </p:spPr>
-        <p:style>
-          <a:lnRef idx="1">
-            <a:schemeClr val="accent1"/>
-          </a:lnRef>
-          <a:fillRef idx="3">
-            <a:schemeClr val="accent1"/>
-          </a:fillRef>
-          <a:effectRef idx="2">
-            <a:schemeClr val="accent1"/>
-          </a:effectRef>
-          <a:fontRef idx="minor">
-            <a:schemeClr val="lt1"/>
-          </a:fontRef>
-        </p:style>
-        <p:txBody>
-          <a:bodyPr rtlCol="0" anchor="ctr"/>
-          <a:lstStyle/>
-          <a:p>
-            <a:pPr algn="ctr"/>
-            <a:endParaRPr lang="en-US" sz="3200"/>
-          </a:p>
-        </p:txBody>
-      </p:sp>
-      <p:sp>
-        <p:nvSpPr>
-          <p:cNvPr id="95" name="Oval 94"/>
-          <p:cNvSpPr>
-            <a:spLocks noChangeAspect="1"/>
-          </p:cNvSpPr>
-          <p:nvPr/>
-        </p:nvSpPr>
-        <p:spPr>
-          <a:xfrm>
-            <a:off x="7286207" y="1186765"/>
-            <a:ext cx="547910" cy="548640"/>
-          </a:xfrm>
-          <a:prstGeom prst="ellipse">
-            <a:avLst/>
-          </a:prstGeom>
-          <a:solidFill>
-            <a:schemeClr val="accent1">
-              <a:alpha val="90000"/>
-            </a:schemeClr>
-          </a:solidFill>
-          <a:ln>
-            <a:noFill/>
-          </a:ln>
-        </p:spPr>
-        <p:style>
-          <a:lnRef idx="1">
-            <a:schemeClr val="accent1"/>
-          </a:lnRef>
-          <a:fillRef idx="3">
-            <a:schemeClr val="accent1"/>
-          </a:fillRef>
-          <a:effectRef idx="2">
-            <a:schemeClr val="accent1"/>
-          </a:effectRef>
-          <a:fontRef idx="minor">
-            <a:schemeClr val="lt1"/>
-          </a:fontRef>
-        </p:style>
-        <p:txBody>
-          <a:bodyPr rtlCol="0" anchor="ctr"/>
-          <a:lstStyle/>
-          <a:p>
-            <a:pPr algn="ctr"/>
-            <a:endParaRPr lang="en-US" sz="3200"/>
           </a:p>
         </p:txBody>
       </p:sp>
@@ -3631,148 +3461,6 @@
       </p:sp>
       <p:sp>
         <p:nvSpPr>
-          <p:cNvPr id="98" name="Oval 97"/>
-          <p:cNvSpPr>
-            <a:spLocks noChangeAspect="1"/>
-          </p:cNvSpPr>
-          <p:nvPr/>
-        </p:nvSpPr>
-        <p:spPr>
-          <a:xfrm>
-            <a:off x="8496787" y="1186765"/>
-            <a:ext cx="547910" cy="548640"/>
-          </a:xfrm>
-          <a:prstGeom prst="ellipse">
-            <a:avLst/>
-          </a:prstGeom>
-          <a:solidFill>
-            <a:schemeClr val="accent1">
-              <a:alpha val="63000"/>
-            </a:schemeClr>
-          </a:solidFill>
-          <a:ln>
-            <a:noFill/>
-          </a:ln>
-        </p:spPr>
-        <p:style>
-          <a:lnRef idx="1">
-            <a:schemeClr val="accent1"/>
-          </a:lnRef>
-          <a:fillRef idx="3">
-            <a:schemeClr val="accent1"/>
-          </a:fillRef>
-          <a:effectRef idx="2">
-            <a:schemeClr val="accent1"/>
-          </a:effectRef>
-          <a:fontRef idx="minor">
-            <a:schemeClr val="lt1"/>
-          </a:fontRef>
-        </p:style>
-        <p:txBody>
-          <a:bodyPr rtlCol="0" anchor="ctr"/>
-          <a:lstStyle/>
-          <a:p>
-            <a:pPr algn="ctr"/>
-            <a:endParaRPr lang="en-US" sz="3200"/>
-          </a:p>
-        </p:txBody>
-      </p:sp>
-      <p:sp>
-        <p:nvSpPr>
-          <p:cNvPr id="99" name="Oval 98"/>
-          <p:cNvSpPr>
-            <a:spLocks noChangeAspect="1"/>
-          </p:cNvSpPr>
-          <p:nvPr/>
-        </p:nvSpPr>
-        <p:spPr>
-          <a:xfrm>
-            <a:off x="6831506" y="1186765"/>
-            <a:ext cx="547910" cy="548640"/>
-          </a:xfrm>
-          <a:prstGeom prst="ellipse">
-            <a:avLst/>
-          </a:prstGeom>
-          <a:solidFill>
-            <a:schemeClr val="accent1"/>
-          </a:solidFill>
-          <a:ln>
-            <a:noFill/>
-          </a:ln>
-        </p:spPr>
-        <p:style>
-          <a:lnRef idx="1">
-            <a:schemeClr val="accent1"/>
-          </a:lnRef>
-          <a:fillRef idx="3">
-            <a:schemeClr val="accent1"/>
-          </a:fillRef>
-          <a:effectRef idx="2">
-            <a:schemeClr val="accent1"/>
-          </a:effectRef>
-          <a:fontRef idx="minor">
-            <a:schemeClr val="lt1"/>
-          </a:fontRef>
-        </p:style>
-        <p:txBody>
-          <a:bodyPr rtlCol="0" anchor="ctr"/>
-          <a:lstStyle/>
-          <a:p>
-            <a:pPr algn="ctr"/>
-            <a:endParaRPr lang="en-US" sz="3200"/>
-          </a:p>
-        </p:txBody>
-      </p:sp>
-      <p:sp>
-        <p:nvSpPr>
-          <p:cNvPr id="100" name="Oval 99"/>
-          <p:cNvSpPr>
-            <a:spLocks noChangeAspect="1"/>
-          </p:cNvSpPr>
-          <p:nvPr/>
-        </p:nvSpPr>
-        <p:spPr>
-          <a:xfrm>
-            <a:off x="6194912" y="317457"/>
-            <a:ext cx="547910" cy="548640"/>
-          </a:xfrm>
-          <a:prstGeom prst="ellipse">
-            <a:avLst/>
-          </a:prstGeom>
-          <a:solidFill>
-            <a:schemeClr val="accent3">
-              <a:lumMod val="50000"/>
-            </a:schemeClr>
-          </a:solidFill>
-          <a:ln>
-            <a:noFill/>
-          </a:ln>
-        </p:spPr>
-        <p:style>
-          <a:lnRef idx="1">
-            <a:schemeClr val="accent1"/>
-          </a:lnRef>
-          <a:fillRef idx="3">
-            <a:schemeClr val="accent1"/>
-          </a:fillRef>
-          <a:effectRef idx="2">
-            <a:schemeClr val="accent1"/>
-          </a:effectRef>
-          <a:fontRef idx="minor">
-            <a:schemeClr val="lt1"/>
-          </a:fontRef>
-        </p:style>
-        <p:txBody>
-          <a:bodyPr rtlCol="0" anchor="ctr"/>
-          <a:lstStyle/>
-          <a:p>
-            <a:pPr algn="ctr"/>
-            <a:endParaRPr lang="en-US" sz="3200"/>
-          </a:p>
-        </p:txBody>
-      </p:sp>
-      <p:sp>
-        <p:nvSpPr>
           <p:cNvPr id="101" name="Oval 100"/>
           <p:cNvSpPr>
             <a:spLocks noChangeAspect="1"/>
@@ -3951,174 +3639,43 @@
           </a:p>
         </p:txBody>
       </p:sp>
-      <p:sp>
-        <p:nvSpPr>
-          <p:cNvPr id="105" name="TextBox 104"/>
-          <p:cNvSpPr txBox="1"/>
+      <p:cxnSp>
+        <p:nvCxnSpPr>
+          <p:cNvPr id="107" name="Straight Arrow Connector 106"/>
+          <p:cNvCxnSpPr/>
           <p:nvPr/>
-        </p:nvSpPr>
+        </p:nvCxnSpPr>
         <p:spPr>
           <a:xfrm>
-            <a:off x="6230295" y="251828"/>
-            <a:ext cx="1181100" cy="584776"/>
+            <a:off x="3686215" y="623591"/>
+            <a:ext cx="1391326" cy="818256"/>
           </a:xfrm>
-          <a:prstGeom prst="rect">
+          <a:prstGeom prst="straightConnector1">
             <a:avLst/>
           </a:prstGeom>
-          <a:noFill/>
+          <a:ln w="38100" cmpd="sng">
+            <a:solidFill>
+              <a:srgbClr val="FF0000"/>
+            </a:solidFill>
+            <a:headEnd type="none"/>
+            <a:tailEnd type="triangle"/>
+          </a:ln>
         </p:spPr>
-        <p:txBody>
-          <a:bodyPr wrap="square" rtlCol="0">
-            <a:spAutoFit/>
-          </a:bodyPr>
-          <a:lstStyle/>
-          <a:p>
-            <a:r>
-              <a:rPr lang="en-US" sz="3200" dirty="0" smtClean="0">
-                <a:solidFill>
-                  <a:schemeClr val="bg1"/>
-                </a:solidFill>
-                <a:latin typeface="Times New Roman"/>
-                <a:cs typeface="Times New Roman"/>
-              </a:rPr>
-              <a:t>A</a:t>
-            </a:r>
-            <a:endParaRPr lang="en-US" sz="3200" dirty="0">
-              <a:solidFill>
-                <a:schemeClr val="bg1"/>
-              </a:solidFill>
-              <a:latin typeface="Times New Roman"/>
-              <a:cs typeface="Times New Roman"/>
-            </a:endParaRPr>
-          </a:p>
-        </p:txBody>
-      </p:sp>
-      <p:grpSp>
-        <p:nvGrpSpPr>
-          <p:cNvPr id="106" name="Group 105"/>
-          <p:cNvGrpSpPr/>
-          <p:nvPr/>
-        </p:nvGrpSpPr>
-        <p:grpSpPr>
-          <a:xfrm>
-            <a:off x="3686215" y="623591"/>
-            <a:ext cx="2782652" cy="818256"/>
-            <a:chOff x="4860965" y="583736"/>
-            <a:chExt cx="2782652" cy="818256"/>
-          </a:xfrm>
-        </p:grpSpPr>
-        <p:cxnSp>
-          <p:nvCxnSpPr>
-            <p:cNvPr id="107" name="Straight Arrow Connector 106"/>
-            <p:cNvCxnSpPr/>
-            <p:nvPr/>
-          </p:nvCxnSpPr>
-          <p:spPr>
-            <a:xfrm>
-              <a:off x="4860965" y="583736"/>
-              <a:ext cx="1391326" cy="818256"/>
-            </a:xfrm>
-            <a:prstGeom prst="straightConnector1">
-              <a:avLst/>
-            </a:prstGeom>
-            <a:ln w="38100" cmpd="sng">
-              <a:solidFill>
-                <a:srgbClr val="FF0000"/>
-              </a:solidFill>
-              <a:headEnd type="none"/>
-              <a:tailEnd type="triangle"/>
-            </a:ln>
-          </p:spPr>
-          <p:style>
-            <a:lnRef idx="2">
-              <a:schemeClr val="accent1"/>
-            </a:lnRef>
-            <a:fillRef idx="0">
-              <a:schemeClr val="accent1"/>
-            </a:fillRef>
-            <a:effectRef idx="1">
-              <a:schemeClr val="accent1"/>
-            </a:effectRef>
-            <a:fontRef idx="minor">
-              <a:schemeClr val="tx1"/>
-            </a:fontRef>
-          </p:style>
-        </p:cxnSp>
-        <p:cxnSp>
-          <p:nvCxnSpPr>
-            <p:cNvPr id="108" name="Straight Arrow Connector 107"/>
-            <p:cNvCxnSpPr/>
-            <p:nvPr/>
-          </p:nvCxnSpPr>
-          <p:spPr>
-            <a:xfrm flipV="1">
-              <a:off x="6252291" y="583736"/>
-              <a:ext cx="1391326" cy="818256"/>
-            </a:xfrm>
-            <a:prstGeom prst="straightConnector1">
-              <a:avLst/>
-            </a:prstGeom>
-            <a:ln w="38100" cmpd="sng">
-              <a:solidFill>
-                <a:srgbClr val="FF0000"/>
-              </a:solidFill>
-              <a:headEnd type="none"/>
-              <a:tailEnd type="triangle"/>
-            </a:ln>
-          </p:spPr>
-          <p:style>
-            <a:lnRef idx="2">
-              <a:schemeClr val="accent1"/>
-            </a:lnRef>
-            <a:fillRef idx="0">
-              <a:schemeClr val="accent1"/>
-            </a:fillRef>
-            <a:effectRef idx="1">
-              <a:schemeClr val="accent1"/>
-            </a:effectRef>
-            <a:fontRef idx="minor">
-              <a:schemeClr val="tx1"/>
-            </a:fontRef>
-          </p:style>
-        </p:cxnSp>
-        <p:cxnSp>
-          <p:nvCxnSpPr>
-            <p:cNvPr id="109" name="Straight Arrow Connector 108"/>
-            <p:cNvCxnSpPr/>
-            <p:nvPr/>
-          </p:nvCxnSpPr>
-          <p:spPr>
-            <a:xfrm flipH="1">
-              <a:off x="5922017" y="583736"/>
-              <a:ext cx="1721600" cy="0"/>
-            </a:xfrm>
-            <a:prstGeom prst="straightConnector1">
-              <a:avLst/>
-            </a:prstGeom>
-            <a:ln w="38100" cmpd="sng">
-              <a:solidFill>
-                <a:srgbClr val="FF0000"/>
-              </a:solidFill>
-              <a:headEnd type="none"/>
-              <a:tailEnd type="triangle"/>
-            </a:ln>
-          </p:spPr>
-          <p:style>
-            <a:lnRef idx="2">
-              <a:schemeClr val="accent1"/>
-            </a:lnRef>
-            <a:fillRef idx="0">
-              <a:schemeClr val="accent1"/>
-            </a:fillRef>
-            <a:effectRef idx="1">
-              <a:schemeClr val="accent1"/>
-            </a:effectRef>
-            <a:fontRef idx="minor">
-              <a:schemeClr val="tx1"/>
-            </a:fontRef>
-          </p:style>
-        </p:cxnSp>
-      </p:grpSp>
+        <p:style>
+          <a:lnRef idx="2">
+            <a:schemeClr val="accent1"/>
+          </a:lnRef>
+          <a:fillRef idx="0">
+            <a:schemeClr val="accent1"/>
+          </a:fillRef>
+          <a:effectRef idx="1">
+            <a:schemeClr val="accent1"/>
+          </a:effectRef>
+          <a:fontRef idx="minor">
+            <a:schemeClr val="tx1"/>
+          </a:fontRef>
+        </p:style>
+      </p:cxnSp>
       <p:sp>
         <p:nvSpPr>
           <p:cNvPr id="110" name="TextBox 109"/>
@@ -4203,300 +3760,43 @@
           </a:p>
         </p:txBody>
       </p:sp>
-      <p:sp>
-        <p:nvSpPr>
-          <p:cNvPr id="112" name="TextBox 111"/>
-          <p:cNvSpPr txBox="1"/>
+      <p:cxnSp>
+        <p:nvCxnSpPr>
+          <p:cNvPr id="117" name="Straight Arrow Connector 116"/>
+          <p:cNvCxnSpPr/>
           <p:nvPr/>
-        </p:nvSpPr>
+        </p:nvCxnSpPr>
         <p:spPr>
           <a:xfrm>
-            <a:off x="8549397" y="1155015"/>
-            <a:ext cx="1181100" cy="584776"/>
+            <a:off x="5988090" y="1441847"/>
+            <a:ext cx="1391326" cy="818256"/>
           </a:xfrm>
-          <a:prstGeom prst="rect">
+          <a:prstGeom prst="straightConnector1">
             <a:avLst/>
           </a:prstGeom>
-          <a:noFill/>
+          <a:ln w="38100" cmpd="sng">
+            <a:solidFill>
+              <a:srgbClr val="FF0000"/>
+            </a:solidFill>
+            <a:headEnd type="none"/>
+            <a:tailEnd type="triangle"/>
+          </a:ln>
         </p:spPr>
-        <p:txBody>
-          <a:bodyPr wrap="square" rtlCol="0">
-            <a:spAutoFit/>
-          </a:bodyPr>
-          <a:lstStyle/>
-          <a:p>
-            <a:r>
-              <a:rPr lang="en-US" sz="3200" dirty="0" smtClean="0">
-                <a:solidFill>
-                  <a:schemeClr val="bg1"/>
-                </a:solidFill>
-                <a:latin typeface="Times New Roman"/>
-                <a:cs typeface="Times New Roman"/>
-              </a:rPr>
-              <a:t>B</a:t>
-            </a:r>
-            <a:endParaRPr lang="en-US" sz="3200" dirty="0">
-              <a:solidFill>
-                <a:schemeClr val="bg1"/>
-              </a:solidFill>
-              <a:latin typeface="Times New Roman"/>
-              <a:cs typeface="Times New Roman"/>
-            </a:endParaRPr>
-          </a:p>
-        </p:txBody>
-      </p:sp>
-      <p:sp>
-        <p:nvSpPr>
-          <p:cNvPr id="113" name="TextBox 112"/>
-          <p:cNvSpPr txBox="1"/>
-          <p:nvPr/>
-        </p:nvSpPr>
-        <p:spPr>
-          <a:xfrm>
-            <a:off x="7806487" y="1147207"/>
-            <a:ext cx="1181100" cy="584776"/>
-          </a:xfrm>
-          <a:prstGeom prst="rect">
-            <a:avLst/>
-          </a:prstGeom>
-          <a:noFill/>
-        </p:spPr>
-        <p:txBody>
-          <a:bodyPr wrap="square" rtlCol="0">
-            <a:spAutoFit/>
-          </a:bodyPr>
-          <a:lstStyle/>
-          <a:p>
-            <a:r>
-              <a:rPr lang="en-US" sz="3200" dirty="0" smtClean="0">
-                <a:solidFill>
-                  <a:schemeClr val="bg1"/>
-                </a:solidFill>
-                <a:latin typeface="Times New Roman"/>
-                <a:cs typeface="Times New Roman"/>
-              </a:rPr>
-              <a:t>B</a:t>
-            </a:r>
-            <a:endParaRPr lang="en-US" sz="3200" dirty="0">
-              <a:solidFill>
-                <a:schemeClr val="bg1"/>
-              </a:solidFill>
-              <a:latin typeface="Times New Roman"/>
-              <a:cs typeface="Times New Roman"/>
-            </a:endParaRPr>
-          </a:p>
-        </p:txBody>
-      </p:sp>
-      <p:sp>
-        <p:nvSpPr>
-          <p:cNvPr id="114" name="TextBox 113"/>
-          <p:cNvSpPr txBox="1"/>
-          <p:nvPr/>
-        </p:nvSpPr>
-        <p:spPr>
-          <a:xfrm>
-            <a:off x="7338884" y="1153022"/>
-            <a:ext cx="1181100" cy="584776"/>
-          </a:xfrm>
-          <a:prstGeom prst="rect">
-            <a:avLst/>
-          </a:prstGeom>
-          <a:noFill/>
-        </p:spPr>
-        <p:txBody>
-          <a:bodyPr wrap="square" rtlCol="0">
-            <a:spAutoFit/>
-          </a:bodyPr>
-          <a:lstStyle/>
-          <a:p>
-            <a:r>
-              <a:rPr lang="en-US" sz="3200" dirty="0" smtClean="0">
-                <a:solidFill>
-                  <a:schemeClr val="bg1"/>
-                </a:solidFill>
-                <a:latin typeface="Times New Roman"/>
-                <a:cs typeface="Times New Roman"/>
-              </a:rPr>
-              <a:t>B</a:t>
-            </a:r>
-            <a:endParaRPr lang="en-US" sz="3200" dirty="0">
-              <a:solidFill>
-                <a:schemeClr val="bg1"/>
-              </a:solidFill>
-              <a:latin typeface="Times New Roman"/>
-              <a:cs typeface="Times New Roman"/>
-            </a:endParaRPr>
-          </a:p>
-        </p:txBody>
-      </p:sp>
-      <p:sp>
-        <p:nvSpPr>
-          <p:cNvPr id="115" name="TextBox 114"/>
-          <p:cNvSpPr txBox="1"/>
-          <p:nvPr/>
-        </p:nvSpPr>
-        <p:spPr>
-          <a:xfrm>
-            <a:off x="6895911" y="1131332"/>
-            <a:ext cx="1181100" cy="584776"/>
-          </a:xfrm>
-          <a:prstGeom prst="rect">
-            <a:avLst/>
-          </a:prstGeom>
-          <a:noFill/>
-        </p:spPr>
-        <p:txBody>
-          <a:bodyPr wrap="square" rtlCol="0">
-            <a:spAutoFit/>
-          </a:bodyPr>
-          <a:lstStyle/>
-          <a:p>
-            <a:r>
-              <a:rPr lang="en-US" sz="3200" dirty="0" smtClean="0">
-                <a:solidFill>
-                  <a:schemeClr val="bg1"/>
-                </a:solidFill>
-                <a:latin typeface="Times New Roman"/>
-                <a:cs typeface="Times New Roman"/>
-              </a:rPr>
-              <a:t>B</a:t>
-            </a:r>
-            <a:endParaRPr lang="en-US" sz="3200" dirty="0">
-              <a:solidFill>
-                <a:schemeClr val="bg1"/>
-              </a:solidFill>
-              <a:latin typeface="Times New Roman"/>
-              <a:cs typeface="Times New Roman"/>
-            </a:endParaRPr>
-          </a:p>
-        </p:txBody>
-      </p:sp>
-      <p:grpSp>
-        <p:nvGrpSpPr>
-          <p:cNvPr id="116" name="Group 115"/>
-          <p:cNvGrpSpPr/>
-          <p:nvPr/>
-        </p:nvGrpSpPr>
-        <p:grpSpPr>
-          <a:xfrm>
-            <a:off x="5988090" y="1441847"/>
-            <a:ext cx="2782652" cy="818256"/>
-            <a:chOff x="5797590" y="1969085"/>
-            <a:chExt cx="2782652" cy="818256"/>
-          </a:xfrm>
-        </p:grpSpPr>
-        <p:cxnSp>
-          <p:nvCxnSpPr>
-            <p:cNvPr id="117" name="Straight Arrow Connector 116"/>
-            <p:cNvCxnSpPr/>
-            <p:nvPr/>
-          </p:nvCxnSpPr>
-          <p:spPr>
-            <a:xfrm>
-              <a:off x="5797590" y="1969085"/>
-              <a:ext cx="1391326" cy="818256"/>
-            </a:xfrm>
-            <a:prstGeom prst="straightConnector1">
-              <a:avLst/>
-            </a:prstGeom>
-            <a:ln w="38100" cmpd="sng">
-              <a:solidFill>
-                <a:srgbClr val="FF0000"/>
-              </a:solidFill>
-              <a:headEnd type="none"/>
-              <a:tailEnd type="triangle"/>
-            </a:ln>
-          </p:spPr>
-          <p:style>
-            <a:lnRef idx="2">
-              <a:schemeClr val="accent1"/>
-            </a:lnRef>
-            <a:fillRef idx="0">
-              <a:schemeClr val="accent1"/>
-            </a:fillRef>
-            <a:effectRef idx="1">
-              <a:schemeClr val="accent1"/>
-            </a:effectRef>
-            <a:fontRef idx="minor">
-              <a:schemeClr val="tx1"/>
-            </a:fontRef>
-          </p:style>
-        </p:cxnSp>
-        <p:cxnSp>
-          <p:nvCxnSpPr>
-            <p:cNvPr id="118" name="Straight Arrow Connector 117"/>
-            <p:cNvCxnSpPr/>
-            <p:nvPr/>
-          </p:nvCxnSpPr>
-          <p:spPr>
-            <a:xfrm flipV="1">
-              <a:off x="7188916" y="1969085"/>
-              <a:ext cx="1391326" cy="818256"/>
-            </a:xfrm>
-            <a:prstGeom prst="straightConnector1">
-              <a:avLst/>
-            </a:prstGeom>
-            <a:ln w="38100" cmpd="sng">
-              <a:solidFill>
-                <a:srgbClr val="FF0000"/>
-              </a:solidFill>
-              <a:headEnd type="none"/>
-              <a:tailEnd type="triangle"/>
-            </a:ln>
-          </p:spPr>
-          <p:style>
-            <a:lnRef idx="2">
-              <a:schemeClr val="accent1"/>
-            </a:lnRef>
-            <a:fillRef idx="0">
-              <a:schemeClr val="accent1"/>
-            </a:fillRef>
-            <a:effectRef idx="1">
-              <a:schemeClr val="accent1"/>
-            </a:effectRef>
-            <a:fontRef idx="minor">
-              <a:schemeClr val="tx1"/>
-            </a:fontRef>
-          </p:style>
-        </p:cxnSp>
-        <p:cxnSp>
-          <p:nvCxnSpPr>
-            <p:cNvPr id="119" name="Straight Arrow Connector 118"/>
-            <p:cNvCxnSpPr/>
-            <p:nvPr/>
-          </p:nvCxnSpPr>
-          <p:spPr>
-            <a:xfrm flipH="1">
-              <a:off x="6858642" y="1969085"/>
-              <a:ext cx="1721600" cy="0"/>
-            </a:xfrm>
-            <a:prstGeom prst="straightConnector1">
-              <a:avLst/>
-            </a:prstGeom>
-            <a:ln w="38100" cmpd="sng">
-              <a:solidFill>
-                <a:srgbClr val="FF0000"/>
-              </a:solidFill>
-              <a:headEnd type="none"/>
-              <a:tailEnd type="triangle"/>
-            </a:ln>
-          </p:spPr>
-          <p:style>
-            <a:lnRef idx="2">
-              <a:schemeClr val="accent1"/>
-            </a:lnRef>
-            <a:fillRef idx="0">
-              <a:schemeClr val="accent1"/>
-            </a:fillRef>
-            <a:effectRef idx="1">
-              <a:schemeClr val="accent1"/>
-            </a:effectRef>
-            <a:fontRef idx="minor">
-              <a:schemeClr val="tx1"/>
-            </a:fontRef>
-          </p:style>
-        </p:cxnSp>
-      </p:grpSp>
+        <p:style>
+          <a:lnRef idx="2">
+            <a:schemeClr val="accent1"/>
+          </a:lnRef>
+          <a:fillRef idx="0">
+            <a:schemeClr val="accent1"/>
+          </a:fillRef>
+          <a:effectRef idx="1">
+            <a:schemeClr val="accent1"/>
+          </a:effectRef>
+          <a:fontRef idx="minor">
+            <a:schemeClr val="tx1"/>
+          </a:fontRef>
+        </p:style>
+      </p:cxnSp>
       <p:sp>
         <p:nvSpPr>
           <p:cNvPr id="84" name="Rectangle 83"/>
@@ -4566,78 +3866,6 @@
                 <a:cs typeface="Times New Roman"/>
               </a:rPr>
               <a:t>1.)</a:t>
-            </a:r>
-            <a:endParaRPr lang="en-US" sz="3200" dirty="0">
-              <a:latin typeface="Times New Roman"/>
-              <a:cs typeface="Times New Roman"/>
-            </a:endParaRPr>
-          </a:p>
-        </p:txBody>
-      </p:sp>
-      <p:sp>
-        <p:nvSpPr>
-          <p:cNvPr id="121" name="TextBox 120"/>
-          <p:cNvSpPr txBox="1"/>
-          <p:nvPr/>
-        </p:nvSpPr>
-        <p:spPr>
-          <a:xfrm>
-            <a:off x="2086617" y="1551662"/>
-            <a:ext cx="1181100" cy="584776"/>
-          </a:xfrm>
-          <a:prstGeom prst="rect">
-            <a:avLst/>
-          </a:prstGeom>
-          <a:noFill/>
-        </p:spPr>
-        <p:txBody>
-          <a:bodyPr wrap="square" rtlCol="0">
-            <a:spAutoFit/>
-          </a:bodyPr>
-          <a:lstStyle/>
-          <a:p>
-            <a:r>
-              <a:rPr lang="en-US" sz="3200" dirty="0" smtClean="0">
-                <a:latin typeface="Times New Roman"/>
-                <a:cs typeface="Times New Roman"/>
-              </a:rPr>
-              <a:t>2.)</a:t>
-            </a:r>
-            <a:endParaRPr lang="en-US" sz="3200" dirty="0">
-              <a:latin typeface="Times New Roman"/>
-              <a:cs typeface="Times New Roman"/>
-            </a:endParaRPr>
-          </a:p>
-        </p:txBody>
-      </p:sp>
-      <p:sp>
-        <p:nvSpPr>
-          <p:cNvPr id="122" name="TextBox 121"/>
-          <p:cNvSpPr txBox="1"/>
-          <p:nvPr/>
-        </p:nvSpPr>
-        <p:spPr>
-          <a:xfrm>
-            <a:off x="1251934" y="1226582"/>
-            <a:ext cx="1181100" cy="584776"/>
-          </a:xfrm>
-          <a:prstGeom prst="rect">
-            <a:avLst/>
-          </a:prstGeom>
-          <a:noFill/>
-        </p:spPr>
-        <p:txBody>
-          <a:bodyPr wrap="square" rtlCol="0">
-            <a:spAutoFit/>
-          </a:bodyPr>
-          <a:lstStyle/>
-          <a:p>
-            <a:r>
-              <a:rPr lang="en-US" sz="3200" dirty="0" smtClean="0">
-                <a:latin typeface="Times New Roman"/>
-                <a:cs typeface="Times New Roman"/>
-              </a:rPr>
-              <a:t>3.)</a:t>
             </a:r>
             <a:endParaRPr lang="en-US" sz="3200" dirty="0">
               <a:latin typeface="Times New Roman"/>

</xml_diff>

<commit_message>
worked on intro, theory, and experiment
mostly grammar and continuity
</commit_message>
<xml_diff>
--- a/IROS17/pictures/pdf/driftmove.pptx
+++ b/IROS17/pictures/pdf/driftmove.pptx
@@ -288,7 +288,7 @@
           <a:p>
             <a:fld id="{2ECC5DDF-89BA-FF4F-A8D3-F81D48191EB2}" type="datetimeFigureOut">
               <a:rPr lang="en-US" smtClean="0"/>
-              <a:t>2/20/17</a:t>
+              <a:t>2/25/17</a:t>
             </a:fld>
             <a:endParaRPr lang="en-US"/>
           </a:p>
@@ -458,7 +458,7 @@
           <a:p>
             <a:fld id="{2ECC5DDF-89BA-FF4F-A8D3-F81D48191EB2}" type="datetimeFigureOut">
               <a:rPr lang="en-US" smtClean="0"/>
-              <a:t>2/20/17</a:t>
+              <a:t>2/25/17</a:t>
             </a:fld>
             <a:endParaRPr lang="en-US"/>
           </a:p>
@@ -638,7 +638,7 @@
           <a:p>
             <a:fld id="{2ECC5DDF-89BA-FF4F-A8D3-F81D48191EB2}" type="datetimeFigureOut">
               <a:rPr lang="en-US" smtClean="0"/>
-              <a:t>2/20/17</a:t>
+              <a:t>2/25/17</a:t>
             </a:fld>
             <a:endParaRPr lang="en-US"/>
           </a:p>
@@ -808,7 +808,7 @@
           <a:p>
             <a:fld id="{2ECC5DDF-89BA-FF4F-A8D3-F81D48191EB2}" type="datetimeFigureOut">
               <a:rPr lang="en-US" smtClean="0"/>
-              <a:t>2/20/17</a:t>
+              <a:t>2/25/17</a:t>
             </a:fld>
             <a:endParaRPr lang="en-US"/>
           </a:p>
@@ -1054,7 +1054,7 @@
           <a:p>
             <a:fld id="{2ECC5DDF-89BA-FF4F-A8D3-F81D48191EB2}" type="datetimeFigureOut">
               <a:rPr lang="en-US" smtClean="0"/>
-              <a:t>2/20/17</a:t>
+              <a:t>2/25/17</a:t>
             </a:fld>
             <a:endParaRPr lang="en-US"/>
           </a:p>
@@ -1342,7 +1342,7 @@
           <a:p>
             <a:fld id="{2ECC5DDF-89BA-FF4F-A8D3-F81D48191EB2}" type="datetimeFigureOut">
               <a:rPr lang="en-US" smtClean="0"/>
-              <a:t>2/20/17</a:t>
+              <a:t>2/25/17</a:t>
             </a:fld>
             <a:endParaRPr lang="en-US"/>
           </a:p>
@@ -1764,7 +1764,7 @@
           <a:p>
             <a:fld id="{2ECC5DDF-89BA-FF4F-A8D3-F81D48191EB2}" type="datetimeFigureOut">
               <a:rPr lang="en-US" smtClean="0"/>
-              <a:t>2/20/17</a:t>
+              <a:t>2/25/17</a:t>
             </a:fld>
             <a:endParaRPr lang="en-US"/>
           </a:p>
@@ -1882,7 +1882,7 @@
           <a:p>
             <a:fld id="{2ECC5DDF-89BA-FF4F-A8D3-F81D48191EB2}" type="datetimeFigureOut">
               <a:rPr lang="en-US" smtClean="0"/>
-              <a:t>2/20/17</a:t>
+              <a:t>2/25/17</a:t>
             </a:fld>
             <a:endParaRPr lang="en-US"/>
           </a:p>
@@ -1977,7 +1977,7 @@
           <a:p>
             <a:fld id="{2ECC5DDF-89BA-FF4F-A8D3-F81D48191EB2}" type="datetimeFigureOut">
               <a:rPr lang="en-US" smtClean="0"/>
-              <a:t>2/20/17</a:t>
+              <a:t>2/25/17</a:t>
             </a:fld>
             <a:endParaRPr lang="en-US"/>
           </a:p>
@@ -2254,7 +2254,7 @@
           <a:p>
             <a:fld id="{2ECC5DDF-89BA-FF4F-A8D3-F81D48191EB2}" type="datetimeFigureOut">
               <a:rPr lang="en-US" smtClean="0"/>
-              <a:t>2/20/17</a:t>
+              <a:t>2/25/17</a:t>
             </a:fld>
             <a:endParaRPr lang="en-US"/>
           </a:p>
@@ -2507,7 +2507,7 @@
           <a:p>
             <a:fld id="{2ECC5DDF-89BA-FF4F-A8D3-F81D48191EB2}" type="datetimeFigureOut">
               <a:rPr lang="en-US" smtClean="0"/>
-              <a:t>2/20/17</a:t>
+              <a:t>2/25/17</a:t>
             </a:fld>
             <a:endParaRPr lang="en-US"/>
           </a:p>
@@ -2720,7 +2720,7 @@
           <a:p>
             <a:fld id="{2ECC5DDF-89BA-FF4F-A8D3-F81D48191EB2}" type="datetimeFigureOut">
               <a:rPr lang="en-US" smtClean="0"/>
-              <a:t>2/20/17</a:t>
+              <a:t>2/25/17</a:t>
             </a:fld>
             <a:endParaRPr lang="en-US"/>
           </a:p>
@@ -3293,42 +3293,6 @@
       </p:sp>
       <p:sp>
         <p:nvSpPr>
-          <p:cNvPr id="92" name="TextBox 91"/>
-          <p:cNvSpPr txBox="1"/>
-          <p:nvPr/>
-        </p:nvSpPr>
-        <p:spPr>
-          <a:xfrm>
-            <a:off x="3129699" y="1266199"/>
-            <a:ext cx="1181100" cy="584776"/>
-          </a:xfrm>
-          <a:prstGeom prst="rect">
-            <a:avLst/>
-          </a:prstGeom>
-          <a:noFill/>
-        </p:spPr>
-        <p:txBody>
-          <a:bodyPr wrap="square" rtlCol="0">
-            <a:spAutoFit/>
-          </a:bodyPr>
-          <a:lstStyle/>
-          <a:p>
-            <a:r>
-              <a:rPr lang="en-US" sz="3200" dirty="0" err="1" smtClean="0">
-                <a:latin typeface="Times New Roman"/>
-                <a:cs typeface="Times New Roman"/>
-              </a:rPr>
-              <a:t>ε</a:t>
-            </a:r>
-            <a:endParaRPr lang="en-US" sz="3200" dirty="0">
-              <a:latin typeface="Times New Roman"/>
-              <a:cs typeface="Times New Roman"/>
-            </a:endParaRPr>
-          </a:p>
-        </p:txBody>
-      </p:sp>
-      <p:sp>
-        <p:nvSpPr>
           <p:cNvPr id="93" name="TextBox 92"/>
           <p:cNvSpPr txBox="1"/>
           <p:nvPr/>
@@ -3874,6 +3838,63 @@
           </a:p>
         </p:txBody>
       </p:sp>
+      <p:graphicFrame>
+        <p:nvGraphicFramePr>
+          <p:cNvPr id="21" name="Content Placeholder 3"/>
+          <p:cNvGraphicFramePr>
+            <a:graphicFrameLocks noChangeAspect="1"/>
+          </p:cNvGraphicFramePr>
+          <p:nvPr>
+            <p:extLst>
+              <p:ext uri="{D42A27DB-BD31-4B8C-83A1-F6EECF244321}">
+                <p14:modId xmlns:p14="http://schemas.microsoft.com/office/powerpoint/2010/main" val="1069113142"/>
+              </p:ext>
+            </p:extLst>
+          </p:nvPr>
+        </p:nvGraphicFramePr>
+        <p:xfrm>
+          <a:off x="3164180" y="1315253"/>
+          <a:ext cx="597839" cy="486668"/>
+        </p:xfrm>
+        <a:graphic>
+          <a:graphicData uri="http://schemas.openxmlformats.org/presentationml/2006/ole">
+            <mc:AlternateContent xmlns:mc="http://schemas.openxmlformats.org/markup-compatibility/2006">
+              <mc:Choice xmlns:v="urn:schemas-microsoft-com:vml" Requires="v">
+                <p:oleObj spid="_x0000_s1025" name="Document" r:id="rId3" imgW="9144000" imgH="7442200" progId="Word.Document.12">
+                  <p:embed/>
+                </p:oleObj>
+              </mc:Choice>
+              <mc:Fallback>
+                <p:oleObj name="Document" r:id="rId3" imgW="9144000" imgH="7442200" progId="Word.Document.12">
+                  <p:embed/>
+                  <p:pic>
+                    <p:nvPicPr>
+                      <p:cNvPr id="0" name=""/>
+                      <p:cNvPicPr/>
+                      <p:nvPr/>
+                    </p:nvPicPr>
+                    <p:blipFill>
+                      <a:blip r:embed="rId4"/>
+                      <a:stretch>
+                        <a:fillRect/>
+                      </a:stretch>
+                    </p:blipFill>
+                    <p:spPr>
+                      <a:xfrm>
+                        <a:off x="3164180" y="1315253"/>
+                        <a:ext cx="597839" cy="486668"/>
+                      </a:xfrm>
+                      <a:prstGeom prst="rect">
+                        <a:avLst/>
+                      </a:prstGeom>
+                    </p:spPr>
+                  </p:pic>
+                </p:oleObj>
+              </mc:Fallback>
+            </mc:AlternateContent>
+          </a:graphicData>
+        </a:graphic>
+      </p:graphicFrame>
     </p:spTree>
     <p:extLst>
       <p:ext uri="{BB962C8B-B14F-4D97-AF65-F5344CB8AC3E}">

</xml_diff>